<commit_message>
Updated background More bibs Updated typical projector system image
</commit_message>
<xml_diff>
--- a/fig/tcsa_nsleds_hdiled_array_ratio.pptx
+++ b/fig/tcsa_nsleds_hdiled_array_ratio.pptx
@@ -104,6 +104,11 @@
       </a:defRPr>
     </a:lvl9pPr>
   </p:defaultTextStyle>
+  <p:extLst>
+    <p:ext uri="{EFAFB233-063F-42B5-8137-9DF3F51BA10A}">
+      <p15:sldGuideLst xmlns:p15="http://schemas.microsoft.com/office/powerpoint/2012/main"/>
+    </p:ext>
+  </p:extLst>
 </p:presentation>
 </file>
 
@@ -254,7 +259,7 @@
           <a:p>
             <a:fld id="{8EF48AD5-894A-4223-8192-F9B4C058A35A}" type="datetimeFigureOut">
               <a:rPr lang="en-US" smtClean="0"/>
-              <a:t>3/18/2020</a:t>
+              <a:t>3/19/2020</a:t>
             </a:fld>
             <a:endParaRPr lang="en-US"/>
           </a:p>
@@ -452,7 +457,7 @@
           <a:p>
             <a:fld id="{8EF48AD5-894A-4223-8192-F9B4C058A35A}" type="datetimeFigureOut">
               <a:rPr lang="en-US" smtClean="0"/>
-              <a:t>3/18/2020</a:t>
+              <a:t>3/19/2020</a:t>
             </a:fld>
             <a:endParaRPr lang="en-US"/>
           </a:p>
@@ -660,7 +665,7 @@
           <a:p>
             <a:fld id="{8EF48AD5-894A-4223-8192-F9B4C058A35A}" type="datetimeFigureOut">
               <a:rPr lang="en-US" smtClean="0"/>
-              <a:t>3/18/2020</a:t>
+              <a:t>3/19/2020</a:t>
             </a:fld>
             <a:endParaRPr lang="en-US"/>
           </a:p>
@@ -858,7 +863,7 @@
           <a:p>
             <a:fld id="{8EF48AD5-894A-4223-8192-F9B4C058A35A}" type="datetimeFigureOut">
               <a:rPr lang="en-US" smtClean="0"/>
-              <a:t>3/18/2020</a:t>
+              <a:t>3/19/2020</a:t>
             </a:fld>
             <a:endParaRPr lang="en-US"/>
           </a:p>
@@ -1133,7 +1138,7 @@
           <a:p>
             <a:fld id="{8EF48AD5-894A-4223-8192-F9B4C058A35A}" type="datetimeFigureOut">
               <a:rPr lang="en-US" smtClean="0"/>
-              <a:t>3/18/2020</a:t>
+              <a:t>3/19/2020</a:t>
             </a:fld>
             <a:endParaRPr lang="en-US"/>
           </a:p>
@@ -1398,7 +1403,7 @@
           <a:p>
             <a:fld id="{8EF48AD5-894A-4223-8192-F9B4C058A35A}" type="datetimeFigureOut">
               <a:rPr lang="en-US" smtClean="0"/>
-              <a:t>3/18/2020</a:t>
+              <a:t>3/19/2020</a:t>
             </a:fld>
             <a:endParaRPr lang="en-US"/>
           </a:p>
@@ -1810,7 +1815,7 @@
           <a:p>
             <a:fld id="{8EF48AD5-894A-4223-8192-F9B4C058A35A}" type="datetimeFigureOut">
               <a:rPr lang="en-US" smtClean="0"/>
-              <a:t>3/18/2020</a:t>
+              <a:t>3/19/2020</a:t>
             </a:fld>
             <a:endParaRPr lang="en-US"/>
           </a:p>
@@ -1951,7 +1956,7 @@
           <a:p>
             <a:fld id="{8EF48AD5-894A-4223-8192-F9B4C058A35A}" type="datetimeFigureOut">
               <a:rPr lang="en-US" smtClean="0"/>
-              <a:t>3/18/2020</a:t>
+              <a:t>3/19/2020</a:t>
             </a:fld>
             <a:endParaRPr lang="en-US"/>
           </a:p>
@@ -2064,7 +2069,7 @@
           <a:p>
             <a:fld id="{8EF48AD5-894A-4223-8192-F9B4C058A35A}" type="datetimeFigureOut">
               <a:rPr lang="en-US" smtClean="0"/>
-              <a:t>3/18/2020</a:t>
+              <a:t>3/19/2020</a:t>
             </a:fld>
             <a:endParaRPr lang="en-US"/>
           </a:p>
@@ -2375,7 +2380,7 @@
           <a:p>
             <a:fld id="{8EF48AD5-894A-4223-8192-F9B4C058A35A}" type="datetimeFigureOut">
               <a:rPr lang="en-US" smtClean="0"/>
-              <a:t>3/18/2020</a:t>
+              <a:t>3/19/2020</a:t>
             </a:fld>
             <a:endParaRPr lang="en-US"/>
           </a:p>
@@ -2663,7 +2668,7 @@
           <a:p>
             <a:fld id="{8EF48AD5-894A-4223-8192-F9B4C058A35A}" type="datetimeFigureOut">
               <a:rPr lang="en-US" smtClean="0"/>
-              <a:t>3/18/2020</a:t>
+              <a:t>3/19/2020</a:t>
             </a:fld>
             <a:endParaRPr lang="en-US"/>
           </a:p>
@@ -2904,7 +2909,7 @@
           <a:p>
             <a:fld id="{8EF48AD5-894A-4223-8192-F9B4C058A35A}" type="datetimeFigureOut">
               <a:rPr lang="en-US" smtClean="0"/>
-              <a:t>3/18/2020</a:t>
+              <a:t>3/19/2020</a:t>
             </a:fld>
             <a:endParaRPr lang="en-US"/>
           </a:p>
@@ -3341,7 +3346,16 @@
           <a:prstGeom prst="rect">
             <a:avLst/>
           </a:prstGeom>
-          <a:ln w="38100"/>
+          <a:solidFill>
+            <a:schemeClr val="accent4"/>
+          </a:solidFill>
+          <a:ln w="38100">
+            <a:solidFill>
+              <a:schemeClr val="accent1">
+                <a:lumMod val="50000"/>
+              </a:schemeClr>
+            </a:solidFill>
+          </a:ln>
         </p:spPr>
         <p:style>
           <a:lnRef idx="2">
@@ -3364,7 +3378,7 @@
           <a:lstStyle/>
           <a:p>
             <a:pPr algn="ctr"/>
-            <a:endParaRPr lang="en-US" dirty="0">
+            <a:endParaRPr lang="en-US" sz="2800" dirty="0">
               <a:solidFill>
                 <a:schemeClr val="tx1"/>
               </a:solidFill>
@@ -3372,7 +3386,7 @@
           </a:p>
           <a:p>
             <a:pPr algn="ctr"/>
-            <a:endParaRPr lang="en-US" dirty="0">
+            <a:endParaRPr lang="en-US" sz="2800" dirty="0">
               <a:solidFill>
                 <a:schemeClr val="tx1"/>
               </a:solidFill>
@@ -3380,7 +3394,7 @@
           </a:p>
           <a:p>
             <a:pPr algn="ctr"/>
-            <a:endParaRPr lang="en-US" dirty="0">
+            <a:endParaRPr lang="en-US" sz="2800" dirty="0">
               <a:solidFill>
                 <a:schemeClr val="tx1"/>
               </a:solidFill>
@@ -3388,7 +3402,7 @@
           </a:p>
           <a:p>
             <a:pPr algn="ctr"/>
-            <a:endParaRPr lang="en-US" dirty="0">
+            <a:endParaRPr lang="en-US" sz="2800" dirty="0">
               <a:solidFill>
                 <a:schemeClr val="tx1"/>
               </a:solidFill>
@@ -3396,7 +3410,7 @@
           </a:p>
           <a:p>
             <a:pPr algn="ctr"/>
-            <a:endParaRPr lang="en-US" dirty="0">
+            <a:endParaRPr lang="en-US" sz="2800" dirty="0">
               <a:solidFill>
                 <a:schemeClr val="tx1"/>
               </a:solidFill>
@@ -3404,7 +3418,7 @@
           </a:p>
           <a:p>
             <a:pPr algn="ctr"/>
-            <a:endParaRPr lang="en-US" dirty="0">
+            <a:endParaRPr lang="en-US" sz="2800" dirty="0">
               <a:solidFill>
                 <a:schemeClr val="tx1"/>
               </a:solidFill>
@@ -3412,7 +3426,7 @@
           </a:p>
           <a:p>
             <a:pPr algn="ctr"/>
-            <a:endParaRPr lang="en-US" dirty="0">
+            <a:endParaRPr lang="en-US" sz="2800" dirty="0">
               <a:solidFill>
                 <a:schemeClr val="tx1"/>
               </a:solidFill>
@@ -3420,40 +3434,8 @@
           </a:p>
           <a:p>
             <a:pPr algn="ctr"/>
-            <a:endParaRPr lang="en-US" dirty="0">
-              <a:solidFill>
-                <a:schemeClr val="tx1"/>
-              </a:solidFill>
-            </a:endParaRPr>
-          </a:p>
-          <a:p>
-            <a:pPr algn="ctr"/>
-            <a:endParaRPr lang="en-US" dirty="0">
-              <a:solidFill>
-                <a:schemeClr val="tx1"/>
-              </a:solidFill>
-            </a:endParaRPr>
-          </a:p>
-          <a:p>
-            <a:pPr algn="ctr"/>
-            <a:endParaRPr lang="en-US" dirty="0">
-              <a:solidFill>
-                <a:schemeClr val="tx1"/>
-              </a:solidFill>
-            </a:endParaRPr>
-          </a:p>
-          <a:p>
-            <a:pPr algn="ctr"/>
-            <a:endParaRPr lang="en-US" dirty="0">
-              <a:solidFill>
-                <a:schemeClr val="tx1"/>
-              </a:solidFill>
-            </a:endParaRPr>
-          </a:p>
-          <a:p>
-            <a:pPr algn="ctr"/>
-            <a:r>
-              <a:rPr lang="en-US" dirty="0">
+            <a:r>
+              <a:rPr lang="en-US" sz="2800" dirty="0">
                 <a:solidFill>
                   <a:schemeClr val="tx1"/>
                 </a:solidFill>
@@ -3483,7 +3465,16 @@
           <a:prstGeom prst="rect">
             <a:avLst/>
           </a:prstGeom>
-          <a:ln w="38100"/>
+          <a:solidFill>
+            <a:schemeClr val="accent6"/>
+          </a:solidFill>
+          <a:ln w="38100">
+            <a:solidFill>
+              <a:schemeClr val="accent1">
+                <a:lumMod val="50000"/>
+              </a:schemeClr>
+            </a:solidFill>
+          </a:ln>
         </p:spPr>
         <p:style>
           <a:lnRef idx="2">
@@ -3506,7 +3497,7 @@
           <a:lstStyle/>
           <a:p>
             <a:pPr algn="ctr"/>
-            <a:endParaRPr lang="en-US" dirty="0">
+            <a:endParaRPr lang="en-US" sz="2800" dirty="0">
               <a:solidFill>
                 <a:schemeClr val="tx1"/>
               </a:solidFill>
@@ -3514,7 +3505,7 @@
           </a:p>
           <a:p>
             <a:pPr algn="ctr"/>
-            <a:endParaRPr lang="en-US" dirty="0">
+            <a:endParaRPr lang="en-US" sz="2800" dirty="0">
               <a:solidFill>
                 <a:schemeClr val="tx1"/>
               </a:solidFill>
@@ -3522,7 +3513,7 @@
           </a:p>
           <a:p>
             <a:pPr algn="ctr"/>
-            <a:endParaRPr lang="en-US" dirty="0">
+            <a:endParaRPr lang="en-US" sz="2800" dirty="0">
               <a:solidFill>
                 <a:schemeClr val="tx1"/>
               </a:solidFill>
@@ -3530,24 +3521,8 @@
           </a:p>
           <a:p>
             <a:pPr algn="ctr"/>
-            <a:endParaRPr lang="en-US" dirty="0">
-              <a:solidFill>
-                <a:schemeClr val="tx1"/>
-              </a:solidFill>
-            </a:endParaRPr>
-          </a:p>
-          <a:p>
-            <a:pPr algn="ctr"/>
-            <a:endParaRPr lang="en-US" dirty="0">
-              <a:solidFill>
-                <a:schemeClr val="tx1"/>
-              </a:solidFill>
-            </a:endParaRPr>
-          </a:p>
-          <a:p>
-            <a:pPr algn="ctr"/>
-            <a:r>
-              <a:rPr lang="en-US" dirty="0">
+            <a:r>
+              <a:rPr lang="en-US" sz="2800" dirty="0">
                 <a:solidFill>
                   <a:schemeClr val="tx1"/>
                 </a:solidFill>
@@ -3577,7 +3552,16 @@
           <a:prstGeom prst="rect">
             <a:avLst/>
           </a:prstGeom>
-          <a:ln w="38100"/>
+          <a:solidFill>
+            <a:schemeClr val="accent5"/>
+          </a:solidFill>
+          <a:ln w="38100">
+            <a:solidFill>
+              <a:schemeClr val="accent1">
+                <a:lumMod val="50000"/>
+              </a:schemeClr>
+            </a:solidFill>
+          </a:ln>
         </p:spPr>
         <p:style>
           <a:lnRef idx="2">
@@ -3601,7 +3585,7 @@
           <a:p>
             <a:pPr algn="ctr"/>
             <a:r>
-              <a:rPr lang="en-US" dirty="0">
+              <a:rPr lang="en-US" sz="2800" dirty="0">
                 <a:solidFill>
                   <a:schemeClr val="tx1"/>
                 </a:solidFill>
@@ -3627,8 +3611,8 @@
         </p:nvCxnSpPr>
         <p:spPr>
           <a:xfrm>
-            <a:off x="4538726" y="434340"/>
-            <a:ext cx="0" cy="1457325"/>
+            <a:off x="4536186" y="434340"/>
+            <a:ext cx="0" cy="1437640"/>
           </a:xfrm>
           <a:prstGeom prst="straightConnector1">
             <a:avLst/>
@@ -3670,8 +3654,8 @@
         </p:nvSpPr>
         <p:spPr>
           <a:xfrm rot="16200000">
-            <a:off x="4164003" y="996583"/>
-            <a:ext cx="497252" cy="338554"/>
+            <a:off x="4113499" y="965805"/>
+            <a:ext cx="574196" cy="400110"/>
           </a:xfrm>
           <a:prstGeom prst="rect">
             <a:avLst/>
@@ -3685,7 +3669,11 @@
           <a:lstStyle/>
           <a:p>
             <a:r>
-              <a:rPr lang="en-US" sz="1600" dirty="0"/>
+              <a:rPr lang="en-US" sz="2000" dirty="0">
+                <a:solidFill>
+                  <a:srgbClr val="C00000"/>
+                </a:solidFill>
+              </a:rPr>
               <a:t>512</a:t>
             </a:r>
           </a:p>
@@ -3707,8 +3695,8 @@
         </p:nvCxnSpPr>
         <p:spPr>
           <a:xfrm flipH="1">
-            <a:off x="3103880" y="1874520"/>
-            <a:ext cx="1454785" cy="0"/>
+            <a:off x="3103881" y="1864360"/>
+            <a:ext cx="1434845" cy="0"/>
           </a:xfrm>
           <a:prstGeom prst="straightConnector1">
             <a:avLst/>
@@ -3750,8 +3738,8 @@
         </p:nvSpPr>
         <p:spPr>
           <a:xfrm>
-            <a:off x="3518675" y="1597422"/>
-            <a:ext cx="497252" cy="338554"/>
+            <a:off x="3518675" y="1529642"/>
+            <a:ext cx="574196" cy="400110"/>
           </a:xfrm>
           <a:prstGeom prst="rect">
             <a:avLst/>
@@ -3765,7 +3753,11 @@
           <a:lstStyle/>
           <a:p>
             <a:r>
-              <a:rPr lang="en-US" sz="1600" dirty="0"/>
+              <a:rPr lang="en-US" sz="2000" dirty="0">
+                <a:solidFill>
+                  <a:srgbClr val="C00000"/>
+                </a:solidFill>
+              </a:rPr>
               <a:t>512</a:t>
             </a:r>
           </a:p>
@@ -3787,8 +3779,8 @@
         </p:nvCxnSpPr>
         <p:spPr>
           <a:xfrm>
-            <a:off x="6049391" y="434340"/>
-            <a:ext cx="0" cy="2966085"/>
+            <a:off x="6041771" y="434340"/>
+            <a:ext cx="0" cy="2948305"/>
           </a:xfrm>
           <a:prstGeom prst="straightConnector1">
             <a:avLst/>
@@ -3832,8 +3824,8 @@
         </p:nvCxnSpPr>
         <p:spPr>
           <a:xfrm flipH="1">
-            <a:off x="3103881" y="3385185"/>
-            <a:ext cx="2963544" cy="0"/>
+            <a:off x="3103881" y="3375025"/>
+            <a:ext cx="2945510" cy="0"/>
           </a:xfrm>
           <a:prstGeom prst="straightConnector1">
             <a:avLst/>
@@ -3875,8 +3867,8 @@
         </p:nvSpPr>
         <p:spPr>
           <a:xfrm>
-            <a:off x="4328010" y="3111782"/>
-            <a:ext cx="601447" cy="338554"/>
+            <a:off x="4328010" y="3044002"/>
+            <a:ext cx="704039" cy="400110"/>
           </a:xfrm>
           <a:prstGeom prst="rect">
             <a:avLst/>
@@ -3890,7 +3882,11 @@
           <a:lstStyle/>
           <a:p>
             <a:r>
-              <a:rPr lang="en-US" sz="1600" dirty="0"/>
+              <a:rPr lang="en-US" sz="2000" dirty="0">
+                <a:solidFill>
+                  <a:srgbClr val="C00000"/>
+                </a:solidFill>
+              </a:rPr>
               <a:t>1024</a:t>
             </a:r>
           </a:p>
@@ -3910,8 +3906,8 @@
         </p:nvSpPr>
         <p:spPr>
           <a:xfrm rot="16200000">
-            <a:off x="5648352" y="1747915"/>
-            <a:ext cx="601447" cy="338554"/>
+            <a:off x="5562387" y="1727028"/>
+            <a:ext cx="704039" cy="400110"/>
           </a:xfrm>
           <a:prstGeom prst="rect">
             <a:avLst/>
@@ -3925,7 +3921,11 @@
           <a:lstStyle/>
           <a:p>
             <a:r>
-              <a:rPr lang="en-US" sz="1600" dirty="0"/>
+              <a:rPr lang="en-US" sz="2000" dirty="0">
+                <a:solidFill>
+                  <a:srgbClr val="C00000"/>
+                </a:solidFill>
+              </a:rPr>
               <a:t>1024</a:t>
             </a:r>
           </a:p>
@@ -3947,7 +3947,7 @@
         </p:nvCxnSpPr>
         <p:spPr>
           <a:xfrm flipH="1">
-            <a:off x="3103881" y="6399657"/>
+            <a:off x="3103881" y="6397117"/>
             <a:ext cx="5958839" cy="0"/>
           </a:xfrm>
           <a:prstGeom prst="straightConnector1">
@@ -3993,7 +3993,7 @@
         <p:spPr>
           <a:xfrm>
             <a:off x="9061831" y="434149"/>
-            <a:ext cx="0" cy="5984431"/>
+            <a:ext cx="0" cy="5962968"/>
           </a:xfrm>
           <a:prstGeom prst="straightConnector1">
             <a:avLst/>
@@ -4035,8 +4035,8 @@
         </p:nvSpPr>
         <p:spPr>
           <a:xfrm>
-            <a:off x="5817629" y="6126825"/>
-            <a:ext cx="601447" cy="338554"/>
+            <a:off x="5817629" y="6066665"/>
+            <a:ext cx="704039" cy="400110"/>
           </a:xfrm>
           <a:prstGeom prst="rect">
             <a:avLst/>
@@ -4050,7 +4050,11 @@
           <a:lstStyle/>
           <a:p>
             <a:r>
-              <a:rPr lang="en-US" sz="1600" dirty="0"/>
+              <a:rPr lang="en-US" sz="2000" dirty="0">
+                <a:solidFill>
+                  <a:srgbClr val="C00000"/>
+                </a:solidFill>
+              </a:rPr>
               <a:t>2048</a:t>
             </a:r>
           </a:p>
@@ -4070,8 +4074,8 @@
         </p:nvSpPr>
         <p:spPr>
           <a:xfrm rot="16200000">
-            <a:off x="8649488" y="3111781"/>
-            <a:ext cx="601447" cy="338554"/>
+            <a:off x="8580751" y="3244056"/>
+            <a:ext cx="704039" cy="400110"/>
           </a:xfrm>
           <a:prstGeom prst="rect">
             <a:avLst/>
@@ -4085,7 +4089,11 @@
           <a:lstStyle/>
           <a:p>
             <a:r>
-              <a:rPr lang="en-US" sz="1600" dirty="0"/>
+              <a:rPr lang="en-US" sz="2000" dirty="0">
+                <a:solidFill>
+                  <a:srgbClr val="C00000"/>
+                </a:solidFill>
+              </a:rPr>
               <a:t>2048</a:t>
             </a:r>
           </a:p>

</xml_diff>

<commit_message>
Fixes from defense comments
</commit_message>
<xml_diff>
--- a/fig/tcsa_nsleds_hdiled_array_ratio.pptx
+++ b/fig/tcsa_nsleds_hdiled_array_ratio.pptx
@@ -259,7 +259,7 @@
           <a:p>
             <a:fld id="{8EF48AD5-894A-4223-8192-F9B4C058A35A}" type="datetimeFigureOut">
               <a:rPr lang="en-US" smtClean="0"/>
-              <a:t>3/19/2020</a:t>
+              <a:t>12/2/2020</a:t>
             </a:fld>
             <a:endParaRPr lang="en-US"/>
           </a:p>
@@ -457,7 +457,7 @@
           <a:p>
             <a:fld id="{8EF48AD5-894A-4223-8192-F9B4C058A35A}" type="datetimeFigureOut">
               <a:rPr lang="en-US" smtClean="0"/>
-              <a:t>3/19/2020</a:t>
+              <a:t>12/2/2020</a:t>
             </a:fld>
             <a:endParaRPr lang="en-US"/>
           </a:p>
@@ -665,7 +665,7 @@
           <a:p>
             <a:fld id="{8EF48AD5-894A-4223-8192-F9B4C058A35A}" type="datetimeFigureOut">
               <a:rPr lang="en-US" smtClean="0"/>
-              <a:t>3/19/2020</a:t>
+              <a:t>12/2/2020</a:t>
             </a:fld>
             <a:endParaRPr lang="en-US"/>
           </a:p>
@@ -863,7 +863,7 @@
           <a:p>
             <a:fld id="{8EF48AD5-894A-4223-8192-F9B4C058A35A}" type="datetimeFigureOut">
               <a:rPr lang="en-US" smtClean="0"/>
-              <a:t>3/19/2020</a:t>
+              <a:t>12/2/2020</a:t>
             </a:fld>
             <a:endParaRPr lang="en-US"/>
           </a:p>
@@ -1138,7 +1138,7 @@
           <a:p>
             <a:fld id="{8EF48AD5-894A-4223-8192-F9B4C058A35A}" type="datetimeFigureOut">
               <a:rPr lang="en-US" smtClean="0"/>
-              <a:t>3/19/2020</a:t>
+              <a:t>12/2/2020</a:t>
             </a:fld>
             <a:endParaRPr lang="en-US"/>
           </a:p>
@@ -1403,7 +1403,7 @@
           <a:p>
             <a:fld id="{8EF48AD5-894A-4223-8192-F9B4C058A35A}" type="datetimeFigureOut">
               <a:rPr lang="en-US" smtClean="0"/>
-              <a:t>3/19/2020</a:t>
+              <a:t>12/2/2020</a:t>
             </a:fld>
             <a:endParaRPr lang="en-US"/>
           </a:p>
@@ -1815,7 +1815,7 @@
           <a:p>
             <a:fld id="{8EF48AD5-894A-4223-8192-F9B4C058A35A}" type="datetimeFigureOut">
               <a:rPr lang="en-US" smtClean="0"/>
-              <a:t>3/19/2020</a:t>
+              <a:t>12/2/2020</a:t>
             </a:fld>
             <a:endParaRPr lang="en-US"/>
           </a:p>
@@ -1956,7 +1956,7 @@
           <a:p>
             <a:fld id="{8EF48AD5-894A-4223-8192-F9B4C058A35A}" type="datetimeFigureOut">
               <a:rPr lang="en-US" smtClean="0"/>
-              <a:t>3/19/2020</a:t>
+              <a:t>12/2/2020</a:t>
             </a:fld>
             <a:endParaRPr lang="en-US"/>
           </a:p>
@@ -2069,7 +2069,7 @@
           <a:p>
             <a:fld id="{8EF48AD5-894A-4223-8192-F9B4C058A35A}" type="datetimeFigureOut">
               <a:rPr lang="en-US" smtClean="0"/>
-              <a:t>3/19/2020</a:t>
+              <a:t>12/2/2020</a:t>
             </a:fld>
             <a:endParaRPr lang="en-US"/>
           </a:p>
@@ -2380,7 +2380,7 @@
           <a:p>
             <a:fld id="{8EF48AD5-894A-4223-8192-F9B4C058A35A}" type="datetimeFigureOut">
               <a:rPr lang="en-US" smtClean="0"/>
-              <a:t>3/19/2020</a:t>
+              <a:t>12/2/2020</a:t>
             </a:fld>
             <a:endParaRPr lang="en-US"/>
           </a:p>
@@ -2668,7 +2668,7 @@
           <a:p>
             <a:fld id="{8EF48AD5-894A-4223-8192-F9B4C058A35A}" type="datetimeFigureOut">
               <a:rPr lang="en-US" smtClean="0"/>
-              <a:t>3/19/2020</a:t>
+              <a:t>12/2/2020</a:t>
             </a:fld>
             <a:endParaRPr lang="en-US"/>
           </a:p>
@@ -2909,7 +2909,7 @@
           <a:p>
             <a:fld id="{8EF48AD5-894A-4223-8192-F9B4C058A35A}" type="datetimeFigureOut">
               <a:rPr lang="en-US" smtClean="0"/>
-              <a:t>3/19/2020</a:t>
+              <a:t>12/2/2020</a:t>
             </a:fld>
             <a:endParaRPr lang="en-US"/>
           </a:p>
@@ -3611,8 +3611,8 @@
         </p:nvCxnSpPr>
         <p:spPr>
           <a:xfrm>
-            <a:off x="4536186" y="434340"/>
-            <a:ext cx="0" cy="1437640"/>
+            <a:off x="4503379" y="434340"/>
+            <a:ext cx="0" cy="1465781"/>
           </a:xfrm>
           <a:prstGeom prst="straightConnector1">
             <a:avLst/>
@@ -3654,7 +3654,7 @@
         </p:nvSpPr>
         <p:spPr>
           <a:xfrm rot="16200000">
-            <a:off x="4113499" y="965805"/>
+            <a:off x="4099207" y="965805"/>
             <a:ext cx="574196" cy="400110"/>
           </a:xfrm>
           <a:prstGeom prst="rect">
@@ -3695,8 +3695,8 @@
         </p:nvCxnSpPr>
         <p:spPr>
           <a:xfrm flipH="1">
-            <a:off x="3103881" y="1864360"/>
-            <a:ext cx="1434845" cy="0"/>
+            <a:off x="3103882" y="1834729"/>
+            <a:ext cx="1464943" cy="0"/>
           </a:xfrm>
           <a:prstGeom prst="straightConnector1">
             <a:avLst/>
@@ -3738,7 +3738,7 @@
         </p:nvSpPr>
         <p:spPr>
           <a:xfrm>
-            <a:off x="3518675" y="1529642"/>
+            <a:off x="3518675" y="1500011"/>
             <a:ext cx="574196" cy="400110"/>
           </a:xfrm>
           <a:prstGeom prst="rect">
@@ -3779,8 +3779,8 @@
         </p:nvCxnSpPr>
         <p:spPr>
           <a:xfrm>
-            <a:off x="6041771" y="434340"/>
-            <a:ext cx="0" cy="2948305"/>
+            <a:off x="6014254" y="434340"/>
+            <a:ext cx="0" cy="2980141"/>
           </a:xfrm>
           <a:prstGeom prst="straightConnector1">
             <a:avLst/>
@@ -3824,8 +3824,8 @@
         </p:nvCxnSpPr>
         <p:spPr>
           <a:xfrm flipH="1">
-            <a:off x="3103881" y="3375025"/>
-            <a:ext cx="2945510" cy="0"/>
+            <a:off x="3103881" y="3345394"/>
+            <a:ext cx="2983064" cy="0"/>
           </a:xfrm>
           <a:prstGeom prst="straightConnector1">
             <a:avLst/>
@@ -3867,7 +3867,7 @@
         </p:nvSpPr>
         <p:spPr>
           <a:xfrm>
-            <a:off x="4328010" y="3044002"/>
+            <a:off x="4328010" y="3014371"/>
             <a:ext cx="704039" cy="400110"/>
           </a:xfrm>
           <a:prstGeom prst="rect">
@@ -3906,7 +3906,7 @@
         </p:nvSpPr>
         <p:spPr>
           <a:xfrm rot="16200000">
-            <a:off x="5562387" y="1727028"/>
+            <a:off x="5534870" y="1727028"/>
             <a:ext cx="704039" cy="400110"/>
           </a:xfrm>
           <a:prstGeom prst="rect">
@@ -3947,8 +3947,8 @@
         </p:nvCxnSpPr>
         <p:spPr>
           <a:xfrm flipH="1">
-            <a:off x="3103881" y="6397117"/>
-            <a:ext cx="5958839" cy="0"/>
+            <a:off x="3103882" y="6363253"/>
+            <a:ext cx="5999313" cy="0"/>
           </a:xfrm>
           <a:prstGeom prst="straightConnector1">
             <a:avLst/>
@@ -3992,8 +3992,8 @@
         </p:nvCxnSpPr>
         <p:spPr>
           <a:xfrm>
-            <a:off x="9061831" y="434149"/>
-            <a:ext cx="0" cy="5962968"/>
+            <a:off x="9029024" y="434149"/>
+            <a:ext cx="0" cy="5998762"/>
           </a:xfrm>
           <a:prstGeom prst="straightConnector1">
             <a:avLst/>
@@ -4035,7 +4035,7 @@
         </p:nvSpPr>
         <p:spPr>
           <a:xfrm>
-            <a:off x="5817629" y="6066665"/>
+            <a:off x="5817629" y="6032801"/>
             <a:ext cx="704039" cy="400110"/>
           </a:xfrm>
           <a:prstGeom prst="rect">
@@ -4074,7 +4074,7 @@
         </p:nvSpPr>
         <p:spPr>
           <a:xfrm rot="16200000">
-            <a:off x="8580751" y="3244056"/>
+            <a:off x="8551120" y="3244056"/>
             <a:ext cx="704039" cy="400110"/>
           </a:xfrm>
           <a:prstGeom prst="rect">

</xml_diff>